<commit_message>
import non-fuzzy version of validation panel c
</commit_message>
<xml_diff>
--- a/main_figures/Figures_Validation.pptx
+++ b/main_figures/Figures_Validation.pptx
@@ -258,7 +258,7 @@
       </p15:sldGuideLst>
     </p:ext>
     <p:ext uri="GoogleSlidesCustomDataVersion2">
-      <go:slidesCustomData xmlns="" xmlns:mc="http://schemas.openxmlformats.org/markup-compatibility/2006" xmlns:mv="urn:schemas-microsoft-com:mac:vml" xmlns:c="http://schemas.openxmlformats.org/drawingml/2006/chart" xmlns:dgm="http://schemas.openxmlformats.org/drawingml/2006/diagram" xmlns:o="urn:schemas-microsoft-com:office:office" xmlns:v="urn:schemas-microsoft-com:vml" xmlns:pvml="urn:schemas-microsoft-com:office:powerpoint" xmlns:com="http://schemas.openxmlformats.org/drawingml/2006/compatibility" xmlns:p14="http://schemas.microsoft.com/office/powerpoint/2010/main" xmlns:p15="http://schemas.microsoft.com/office/powerpoint/2012/main" xmlns:ahyp="http://schemas.microsoft.com/office/drawing/2018/hyperlinkcolor" xmlns:go="http://customooxmlschemas.google.com/" r:id="rId9" roundtripDataSignature="AMtx7mgjKmtu8V+N+8vQzdaholJXKXV4Sw=="/>
+      <go:slidesCustomData xmlns:go="http://customooxmlschemas.google.com/" xmlns:ahyp="http://schemas.microsoft.com/office/drawing/2018/hyperlinkcolor" xmlns:p15="http://schemas.microsoft.com/office/powerpoint/2012/main" xmlns:p14="http://schemas.microsoft.com/office/powerpoint/2010/main" xmlns:com="http://schemas.openxmlformats.org/drawingml/2006/compatibility" xmlns:pvml="urn:schemas-microsoft-com:office:powerpoint" xmlns:v="urn:schemas-microsoft-com:vml" xmlns:o="urn:schemas-microsoft-com:office:office" xmlns:dgm="http://schemas.openxmlformats.org/drawingml/2006/diagram" xmlns:c="http://schemas.openxmlformats.org/drawingml/2006/chart" xmlns:mv="urn:schemas-microsoft-com:mac:vml" xmlns:mc="http://schemas.openxmlformats.org/markup-compatibility/2006" xmlns="" r:id="rId9" roundtripDataSignature="AMtx7mgjKmtu8V+N+8vQzdaholJXKXV4Sw=="/>
     </p:ext>
   </p:extLst>
 </p:presentation>
@@ -8847,6 +8847,123 @@
           <a:chExt cx="0" cy="0"/>
         </a:xfrm>
       </p:grpSpPr>
+      <p:grpSp>
+        <p:nvGrpSpPr>
+          <p:cNvPr id="12" name="Group 11">
+            <a:extLst>
+              <a:ext uri="{FF2B5EF4-FFF2-40B4-BE49-F238E27FC236}">
+                <a16:creationId xmlns:a16="http://schemas.microsoft.com/office/drawing/2014/main" id="{9A5AF488-1DE4-14A7-CD44-9C7AFE0BBC7E}"/>
+              </a:ext>
+            </a:extLst>
+          </p:cNvPr>
+          <p:cNvGrpSpPr/>
+          <p:nvPr/>
+        </p:nvGrpSpPr>
+        <p:grpSpPr>
+          <a:xfrm>
+            <a:off x="3963920" y="74675"/>
+            <a:ext cx="3204976" cy="1087401"/>
+            <a:chOff x="3963920" y="74675"/>
+            <a:chExt cx="3204976" cy="1087401"/>
+          </a:xfrm>
+        </p:grpSpPr>
+        <p:pic>
+          <p:nvPicPr>
+            <p:cNvPr id="6" name="Picture 5">
+              <a:extLst>
+                <a:ext uri="{FF2B5EF4-FFF2-40B4-BE49-F238E27FC236}">
+                  <a16:creationId xmlns:a16="http://schemas.microsoft.com/office/drawing/2014/main" id="{63E5955B-FDB0-BB74-EAAC-FF1B9F028D5B}"/>
+                </a:ext>
+              </a:extLst>
+            </p:cNvPr>
+            <p:cNvPicPr>
+              <a:picLocks noChangeAspect="1"/>
+            </p:cNvPicPr>
+            <p:nvPr/>
+          </p:nvPicPr>
+          <p:blipFill>
+            <a:blip r:embed="rId3"/>
+            <a:stretch>
+              <a:fillRect/>
+            </a:stretch>
+          </p:blipFill>
+          <p:spPr>
+            <a:xfrm>
+              <a:off x="4123944" y="164592"/>
+              <a:ext cx="3044952" cy="997484"/>
+            </a:xfrm>
+            <a:prstGeom prst="rect">
+              <a:avLst/>
+            </a:prstGeom>
+          </p:spPr>
+        </p:pic>
+        <p:sp>
+          <p:nvSpPr>
+            <p:cNvPr id="101" name="Google Shape;101;g24e8104fe94_0_0"/>
+            <p:cNvSpPr txBox="1"/>
+            <p:nvPr/>
+          </p:nvSpPr>
+          <p:spPr>
+            <a:xfrm>
+              <a:off x="3963920" y="74675"/>
+              <a:ext cx="281100" cy="400200"/>
+            </a:xfrm>
+            <a:prstGeom prst="rect">
+              <a:avLst/>
+            </a:prstGeom>
+            <a:noFill/>
+            <a:ln>
+              <a:noFill/>
+            </a:ln>
+          </p:spPr>
+          <p:txBody>
+            <a:bodyPr spcFirstLastPara="1" wrap="square" lIns="91425" tIns="91425" rIns="91425" bIns="91425" anchor="t" anchorCtr="0">
+              <a:spAutoFit/>
+            </a:bodyPr>
+            <a:lstStyle/>
+            <a:p>
+              <a:pPr marL="0" marR="0" lvl="0" indent="0" algn="l" rtl="0">
+                <a:lnSpc>
+                  <a:spcPct val="100000"/>
+                </a:lnSpc>
+                <a:spcBef>
+                  <a:spcPts val="0"/>
+                </a:spcBef>
+                <a:spcAft>
+                  <a:spcPts val="0"/>
+                </a:spcAft>
+                <a:buClr>
+                  <a:srgbClr val="000000"/>
+                </a:buClr>
+                <a:buSzPts val="1400"/>
+                <a:buFont typeface="Arial"/>
+                <a:buNone/>
+              </a:pPr>
+              <a:r>
+                <a:rPr lang="en" sz="1400" b="1" i="0" u="none" strike="noStrike" cap="none" dirty="0">
+                  <a:solidFill>
+                    <a:srgbClr val="000000"/>
+                  </a:solidFill>
+                  <a:latin typeface="Arial"/>
+                  <a:ea typeface="Arial"/>
+                  <a:cs typeface="Arial"/>
+                  <a:sym typeface="Arial"/>
+                </a:rPr>
+                <a:t>b</a:t>
+              </a:r>
+              <a:endParaRPr sz="1400" b="1" i="0" u="none" strike="noStrike" cap="none" dirty="0">
+                <a:solidFill>
+                  <a:srgbClr val="000000"/>
+                </a:solidFill>
+                <a:latin typeface="Arial"/>
+                <a:ea typeface="Arial"/>
+                <a:cs typeface="Arial"/>
+                <a:sym typeface="Arial"/>
+              </a:endParaRPr>
+            </a:p>
+          </p:txBody>
+        </p:sp>
+      </p:grpSp>
       <p:pic>
         <p:nvPicPr>
           <p:cNvPr id="10" name="Picture 9">
@@ -8862,7 +8979,7 @@
           <p:nvPr/>
         </p:nvPicPr>
         <p:blipFill rotWithShape="1">
-          <a:blip r:embed="rId3"/>
+          <a:blip r:embed="rId4"/>
           <a:srcRect l="15861" r="29099" b="2674"/>
           <a:stretch/>
         </p:blipFill>
@@ -8891,7 +9008,7 @@
           <p:nvPr/>
         </p:nvPicPr>
         <p:blipFill rotWithShape="1">
-          <a:blip r:embed="rId4"/>
+          <a:blip r:embed="rId5"/>
           <a:srcRect l="14010" r="27474" b="3666"/>
           <a:stretch/>
         </p:blipFill>
@@ -8940,7 +9057,7 @@
             <p:nvPr/>
           </p:nvPicPr>
           <p:blipFill rotWithShape="1">
-            <a:blip r:embed="rId5"/>
+            <a:blip r:embed="rId6"/>
             <a:srcRect t="21690" b="22769"/>
             <a:stretch/>
           </p:blipFill>
@@ -9272,7 +9389,7 @@
             <p:nvPr/>
           </p:nvPicPr>
           <p:blipFill>
-            <a:blip r:embed="rId6"/>
+            <a:blip r:embed="rId7"/>
             <a:stretch>
               <a:fillRect/>
             </a:stretch>
@@ -9585,7 +9702,7 @@
             <p:nvPr/>
           </p:nvPicPr>
           <p:blipFill rotWithShape="1">
-            <a:blip r:embed="rId7">
+            <a:blip r:embed="rId8">
               <a:alphaModFix/>
             </a:blip>
             <a:srcRect/>
@@ -9621,14 +9738,14 @@
           <p:nvPr/>
         </p:nvPicPr>
         <p:blipFill>
-          <a:blip r:embed="rId8"/>
+          <a:blip r:embed="rId9"/>
           <a:stretch>
             <a:fillRect/>
           </a:stretch>
         </p:blipFill>
         <p:spPr>
           <a:xfrm>
-            <a:off x="4176500" y="1136774"/>
+            <a:off x="-3361812" y="2671673"/>
             <a:ext cx="2857103" cy="1589158"/>
           </a:xfrm>
           <a:prstGeom prst="rect">
@@ -9644,7 +9761,7 @@
         </p:nvSpPr>
         <p:spPr>
           <a:xfrm>
-            <a:off x="3963920" y="868500"/>
+            <a:off x="3958922" y="1075757"/>
             <a:ext cx="281100" cy="400200"/>
           </a:xfrm>
           <a:prstGeom prst="rect">
@@ -9717,7 +9834,7 @@
           <p:nvPr/>
         </p:nvPicPr>
         <p:blipFill rotWithShape="1">
-          <a:blip r:embed="rId9"/>
+          <a:blip r:embed="rId10"/>
           <a:srcRect t="40189" b="49251"/>
           <a:stretch/>
         </p:blipFill>
@@ -9766,7 +9883,7 @@
             <p:nvPr/>
           </p:nvPicPr>
           <p:blipFill>
-            <a:blip r:embed="rId10"/>
+            <a:blip r:embed="rId11"/>
             <a:stretch>
               <a:fillRect/>
             </a:stretch>
@@ -9869,7 +9986,7 @@
           <p:nvPr/>
         </p:nvPicPr>
         <p:blipFill rotWithShape="1">
-          <a:blip r:embed="rId11"/>
+          <a:blip r:embed="rId12"/>
           <a:srcRect l="14337" r="29184"/>
           <a:stretch/>
         </p:blipFill>
@@ -9918,7 +10035,7 @@
             <p:nvPr/>
           </p:nvPicPr>
           <p:blipFill>
-            <a:blip r:embed="rId12"/>
+            <a:blip r:embed="rId13"/>
             <a:stretch>
               <a:fillRect/>
             </a:stretch>
@@ -10021,7 +10138,7 @@
           <p:nvPr/>
         </p:nvPicPr>
         <p:blipFill>
-          <a:blip r:embed="rId13"/>
+          <a:blip r:embed="rId14"/>
           <a:stretch>
             <a:fillRect/>
           </a:stretch>
@@ -10036,123 +10153,6 @@
           </a:prstGeom>
         </p:spPr>
       </p:pic>
-      <p:grpSp>
-        <p:nvGrpSpPr>
-          <p:cNvPr id="12" name="Group 11">
-            <a:extLst>
-              <a:ext uri="{FF2B5EF4-FFF2-40B4-BE49-F238E27FC236}">
-                <a16:creationId xmlns:a16="http://schemas.microsoft.com/office/drawing/2014/main" id="{9A5AF488-1DE4-14A7-CD44-9C7AFE0BBC7E}"/>
-              </a:ext>
-            </a:extLst>
-          </p:cNvPr>
-          <p:cNvGrpSpPr/>
-          <p:nvPr/>
-        </p:nvGrpSpPr>
-        <p:grpSpPr>
-          <a:xfrm>
-            <a:off x="3963920" y="74675"/>
-            <a:ext cx="3204976" cy="1087401"/>
-            <a:chOff x="3963920" y="74675"/>
-            <a:chExt cx="3204976" cy="1087401"/>
-          </a:xfrm>
-        </p:grpSpPr>
-        <p:sp>
-          <p:nvSpPr>
-            <p:cNvPr id="101" name="Google Shape;101;g24e8104fe94_0_0"/>
-            <p:cNvSpPr txBox="1"/>
-            <p:nvPr/>
-          </p:nvSpPr>
-          <p:spPr>
-            <a:xfrm>
-              <a:off x="3963920" y="74675"/>
-              <a:ext cx="281100" cy="400200"/>
-            </a:xfrm>
-            <a:prstGeom prst="rect">
-              <a:avLst/>
-            </a:prstGeom>
-            <a:noFill/>
-            <a:ln>
-              <a:noFill/>
-            </a:ln>
-          </p:spPr>
-          <p:txBody>
-            <a:bodyPr spcFirstLastPara="1" wrap="square" lIns="91425" tIns="91425" rIns="91425" bIns="91425" anchor="t" anchorCtr="0">
-              <a:spAutoFit/>
-            </a:bodyPr>
-            <a:lstStyle/>
-            <a:p>
-              <a:pPr marL="0" marR="0" lvl="0" indent="0" algn="l" rtl="0">
-                <a:lnSpc>
-                  <a:spcPct val="100000"/>
-                </a:lnSpc>
-                <a:spcBef>
-                  <a:spcPts val="0"/>
-                </a:spcBef>
-                <a:spcAft>
-                  <a:spcPts val="0"/>
-                </a:spcAft>
-                <a:buClr>
-                  <a:srgbClr val="000000"/>
-                </a:buClr>
-                <a:buSzPts val="1400"/>
-                <a:buFont typeface="Arial"/>
-                <a:buNone/>
-              </a:pPr>
-              <a:r>
-                <a:rPr lang="en" sz="1400" b="1" i="0" u="none" strike="noStrike" cap="none" dirty="0">
-                  <a:solidFill>
-                    <a:srgbClr val="000000"/>
-                  </a:solidFill>
-                  <a:latin typeface="Arial"/>
-                  <a:ea typeface="Arial"/>
-                  <a:cs typeface="Arial"/>
-                  <a:sym typeface="Arial"/>
-                </a:rPr>
-                <a:t>b</a:t>
-              </a:r>
-              <a:endParaRPr sz="1400" b="1" i="0" u="none" strike="noStrike" cap="none" dirty="0">
-                <a:solidFill>
-                  <a:srgbClr val="000000"/>
-                </a:solidFill>
-                <a:latin typeface="Arial"/>
-                <a:ea typeface="Arial"/>
-                <a:cs typeface="Arial"/>
-                <a:sym typeface="Arial"/>
-              </a:endParaRPr>
-            </a:p>
-          </p:txBody>
-        </p:sp>
-        <p:pic>
-          <p:nvPicPr>
-            <p:cNvPr id="6" name="Picture 5">
-              <a:extLst>
-                <a:ext uri="{FF2B5EF4-FFF2-40B4-BE49-F238E27FC236}">
-                  <a16:creationId xmlns:a16="http://schemas.microsoft.com/office/drawing/2014/main" id="{63E5955B-FDB0-BB74-EAAC-FF1B9F028D5B}"/>
-                </a:ext>
-              </a:extLst>
-            </p:cNvPr>
-            <p:cNvPicPr>
-              <a:picLocks noChangeAspect="1"/>
-            </p:cNvPicPr>
-            <p:nvPr/>
-          </p:nvPicPr>
-          <p:blipFill>
-            <a:blip r:embed="rId14"/>
-            <a:stretch>
-              <a:fillRect/>
-            </a:stretch>
-          </p:blipFill>
-          <p:spPr>
-            <a:xfrm>
-              <a:off x="4123944" y="164592"/>
-              <a:ext cx="3044952" cy="997484"/>
-            </a:xfrm>
-            <a:prstGeom prst="rect">
-              <a:avLst/>
-            </a:prstGeom>
-          </p:spPr>
-        </p:pic>
-      </p:grpSp>
       <p:pic>
         <p:nvPicPr>
           <p:cNvPr id="29" name="Picture 28">
@@ -10177,6 +10177,36 @@
           <a:xfrm>
             <a:off x="2542327" y="9313616"/>
             <a:ext cx="3130511" cy="1003446"/>
+          </a:xfrm>
+          <a:prstGeom prst="rect">
+            <a:avLst/>
+          </a:prstGeom>
+        </p:spPr>
+      </p:pic>
+      <p:pic>
+        <p:nvPicPr>
+          <p:cNvPr id="3" name="Picture 2">
+            <a:extLst>
+              <a:ext uri="{FF2B5EF4-FFF2-40B4-BE49-F238E27FC236}">
+                <a16:creationId xmlns:a16="http://schemas.microsoft.com/office/drawing/2014/main" id="{C058550E-F54E-F993-ABF7-0FDB8519EB55}"/>
+              </a:ext>
+            </a:extLst>
+          </p:cNvPr>
+          <p:cNvPicPr>
+            <a:picLocks noChangeAspect="1"/>
+          </p:cNvPicPr>
+          <p:nvPr/>
+        </p:nvPicPr>
+        <p:blipFill>
+          <a:blip r:embed="rId16"/>
+          <a:stretch>
+            <a:fillRect/>
+          </a:stretch>
+        </p:blipFill>
+        <p:spPr>
+          <a:xfrm>
+            <a:off x="4159264" y="1186183"/>
+            <a:ext cx="2860516" cy="1591056"/>
           </a:xfrm>
           <a:prstGeom prst="rect">
             <a:avLst/>

</xml_diff>

<commit_message>
validation figure caption fixes
</commit_message>
<xml_diff>
--- a/main_figures/Figures_Validation.pptx
+++ b/main_figures/Figures_Validation.pptx
@@ -9036,7 +9036,7 @@
         </p:nvGrpSpPr>
         <p:grpSpPr>
           <a:xfrm>
-            <a:off x="120875" y="8992950"/>
+            <a:off x="91027" y="8996908"/>
             <a:ext cx="2440126" cy="1529984"/>
             <a:chOff x="120875" y="8992950"/>
             <a:chExt cx="2440126" cy="1529984"/>
@@ -9479,72 +9479,6 @@
       </p:grpSp>
       <p:sp>
         <p:nvSpPr>
-          <p:cNvPr id="99" name="Google Shape;99;g24e8104fe94_0_0"/>
-          <p:cNvSpPr txBox="1"/>
-          <p:nvPr/>
-        </p:nvSpPr>
-        <p:spPr>
-          <a:xfrm>
-            <a:off x="2220587" y="9034526"/>
-            <a:ext cx="281100" cy="431100"/>
-          </a:xfrm>
-          <a:prstGeom prst="rect">
-            <a:avLst/>
-          </a:prstGeom>
-          <a:noFill/>
-          <a:ln>
-            <a:noFill/>
-          </a:ln>
-        </p:spPr>
-        <p:txBody>
-          <a:bodyPr spcFirstLastPara="1" wrap="square" lIns="91425" tIns="91425" rIns="91425" bIns="91425" anchor="t" anchorCtr="0">
-            <a:spAutoFit/>
-          </a:bodyPr>
-          <a:lstStyle/>
-          <a:p>
-            <a:pPr marL="0" marR="0" lvl="0" indent="0" algn="l" rtl="0">
-              <a:lnSpc>
-                <a:spcPct val="100000"/>
-              </a:lnSpc>
-              <a:spcBef>
-                <a:spcPts val="0"/>
-              </a:spcBef>
-              <a:spcAft>
-                <a:spcPts val="0"/>
-              </a:spcAft>
-              <a:buClr>
-                <a:srgbClr val="000000"/>
-              </a:buClr>
-              <a:buSzPts val="1600"/>
-              <a:buFont typeface="Arial"/>
-              <a:buNone/>
-            </a:pPr>
-            <a:r>
-              <a:rPr lang="en" sz="1600" b="1" i="0" u="none" strike="noStrike" cap="none" dirty="0">
-                <a:solidFill>
-                  <a:srgbClr val="000000"/>
-                </a:solidFill>
-                <a:latin typeface="Arial"/>
-                <a:ea typeface="Arial"/>
-                <a:cs typeface="Arial"/>
-                <a:sym typeface="Arial"/>
-              </a:rPr>
-              <a:t>k</a:t>
-            </a:r>
-            <a:endParaRPr sz="1600" b="1" i="0" u="none" strike="noStrike" cap="none" dirty="0">
-              <a:solidFill>
-                <a:srgbClr val="000000"/>
-              </a:solidFill>
-              <a:latin typeface="Arial"/>
-              <a:ea typeface="Arial"/>
-              <a:cs typeface="Arial"/>
-              <a:sym typeface="Arial"/>
-            </a:endParaRPr>
-          </a:p>
-        </p:txBody>
-      </p:sp>
-      <p:sp>
-        <p:nvSpPr>
           <p:cNvPr id="100" name="Google Shape;100;g24e8104fe94_0_0"/>
           <p:cNvSpPr txBox="1"/>
           <p:nvPr/>
@@ -9723,36 +9657,6 @@
           </p:spPr>
         </p:pic>
       </p:grpSp>
-      <p:pic>
-        <p:nvPicPr>
-          <p:cNvPr id="7" name="Picture 6">
-            <a:extLst>
-              <a:ext uri="{FF2B5EF4-FFF2-40B4-BE49-F238E27FC236}">
-                <a16:creationId xmlns:a16="http://schemas.microsoft.com/office/drawing/2014/main" id="{B8E780CB-F9F7-D7BC-4917-20EEBCD8B347}"/>
-              </a:ext>
-            </a:extLst>
-          </p:cNvPr>
-          <p:cNvPicPr>
-            <a:picLocks noChangeAspect="1"/>
-          </p:cNvPicPr>
-          <p:nvPr/>
-        </p:nvPicPr>
-        <p:blipFill>
-          <a:blip r:embed="rId9"/>
-          <a:stretch>
-            <a:fillRect/>
-          </a:stretch>
-        </p:blipFill>
-        <p:spPr>
-          <a:xfrm>
-            <a:off x="-3361812" y="2671673"/>
-            <a:ext cx="2857103" cy="1589158"/>
-          </a:xfrm>
-          <a:prstGeom prst="rect">
-            <a:avLst/>
-          </a:prstGeom>
-        </p:spPr>
-      </p:pic>
       <p:sp>
         <p:nvSpPr>
           <p:cNvPr id="102" name="Google Shape;102;g24e8104fe94_0_0"/>
@@ -9834,7 +9738,7 @@
           <p:nvPr/>
         </p:nvPicPr>
         <p:blipFill rotWithShape="1">
-          <a:blip r:embed="rId10"/>
+          <a:blip r:embed="rId9"/>
           <a:srcRect t="40189" b="49251"/>
           <a:stretch/>
         </p:blipFill>
@@ -9883,7 +9787,7 @@
             <p:nvPr/>
           </p:nvPicPr>
           <p:blipFill>
-            <a:blip r:embed="rId11"/>
+            <a:blip r:embed="rId10"/>
             <a:stretch>
               <a:fillRect/>
             </a:stretch>
@@ -9986,7 +9890,7 @@
           <p:nvPr/>
         </p:nvPicPr>
         <p:blipFill rotWithShape="1">
-          <a:blip r:embed="rId12"/>
+          <a:blip r:embed="rId11"/>
           <a:srcRect l="14337" r="29184"/>
           <a:stretch/>
         </p:blipFill>
@@ -10035,7 +9939,7 @@
             <p:nvPr/>
           </p:nvPicPr>
           <p:blipFill>
-            <a:blip r:embed="rId13"/>
+            <a:blip r:embed="rId12"/>
             <a:stretch>
               <a:fillRect/>
             </a:stretch>
@@ -10138,7 +10042,7 @@
           <p:nvPr/>
         </p:nvPicPr>
         <p:blipFill>
-          <a:blip r:embed="rId14"/>
+          <a:blip r:embed="rId13"/>
           <a:stretch>
             <a:fillRect/>
           </a:stretch>
@@ -10147,36 +10051,6 @@
           <a:xfrm>
             <a:off x="5713478" y="9424050"/>
             <a:ext cx="1589216" cy="1033271"/>
-          </a:xfrm>
-          <a:prstGeom prst="rect">
-            <a:avLst/>
-          </a:prstGeom>
-        </p:spPr>
-      </p:pic>
-      <p:pic>
-        <p:nvPicPr>
-          <p:cNvPr id="29" name="Picture 28">
-            <a:extLst>
-              <a:ext uri="{FF2B5EF4-FFF2-40B4-BE49-F238E27FC236}">
-                <a16:creationId xmlns:a16="http://schemas.microsoft.com/office/drawing/2014/main" id="{0BC0C8F4-1947-8987-C4D4-C4FFA77F8F1B}"/>
-              </a:ext>
-            </a:extLst>
-          </p:cNvPr>
-          <p:cNvPicPr>
-            <a:picLocks noChangeAspect="1"/>
-          </p:cNvPicPr>
-          <p:nvPr/>
-        </p:nvPicPr>
-        <p:blipFill>
-          <a:blip r:embed="rId15"/>
-          <a:stretch>
-            <a:fillRect/>
-          </a:stretch>
-        </p:blipFill>
-        <p:spPr>
-          <a:xfrm>
-            <a:off x="2542327" y="9313616"/>
-            <a:ext cx="3130511" cy="1003446"/>
           </a:xfrm>
           <a:prstGeom prst="rect">
             <a:avLst/>
@@ -10198,7 +10072,7 @@
           <p:nvPr/>
         </p:nvPicPr>
         <p:blipFill>
-          <a:blip r:embed="rId16"/>
+          <a:blip r:embed="rId14"/>
           <a:stretch>
             <a:fillRect/>
           </a:stretch>
@@ -10213,6 +10087,123 @@
           </a:prstGeom>
         </p:spPr>
       </p:pic>
+      <p:grpSp>
+        <p:nvGrpSpPr>
+          <p:cNvPr id="13" name="Group 12">
+            <a:extLst>
+              <a:ext uri="{FF2B5EF4-FFF2-40B4-BE49-F238E27FC236}">
+                <a16:creationId xmlns:a16="http://schemas.microsoft.com/office/drawing/2014/main" id="{D216A092-7856-4AE8-1AEB-EFCE670573B1}"/>
+              </a:ext>
+            </a:extLst>
+          </p:cNvPr>
+          <p:cNvGrpSpPr/>
+          <p:nvPr/>
+        </p:nvGrpSpPr>
+        <p:grpSpPr>
+          <a:xfrm>
+            <a:off x="2392768" y="9044588"/>
+            <a:ext cx="3136224" cy="1179700"/>
+            <a:chOff x="2392768" y="9044588"/>
+            <a:chExt cx="3136224" cy="1179700"/>
+          </a:xfrm>
+        </p:grpSpPr>
+        <p:sp>
+          <p:nvSpPr>
+            <p:cNvPr id="99" name="Google Shape;99;g24e8104fe94_0_0"/>
+            <p:cNvSpPr txBox="1"/>
+            <p:nvPr/>
+          </p:nvSpPr>
+          <p:spPr>
+            <a:xfrm>
+              <a:off x="2392768" y="9044588"/>
+              <a:ext cx="281100" cy="431100"/>
+            </a:xfrm>
+            <a:prstGeom prst="rect">
+              <a:avLst/>
+            </a:prstGeom>
+            <a:noFill/>
+            <a:ln>
+              <a:noFill/>
+            </a:ln>
+          </p:spPr>
+          <p:txBody>
+            <a:bodyPr spcFirstLastPara="1" wrap="square" lIns="91425" tIns="91425" rIns="91425" bIns="91425" anchor="t" anchorCtr="0">
+              <a:spAutoFit/>
+            </a:bodyPr>
+            <a:lstStyle/>
+            <a:p>
+              <a:pPr marL="0" marR="0" lvl="0" indent="0" algn="l" rtl="0">
+                <a:lnSpc>
+                  <a:spcPct val="100000"/>
+                </a:lnSpc>
+                <a:spcBef>
+                  <a:spcPts val="0"/>
+                </a:spcBef>
+                <a:spcAft>
+                  <a:spcPts val="0"/>
+                </a:spcAft>
+                <a:buClr>
+                  <a:srgbClr val="000000"/>
+                </a:buClr>
+                <a:buSzPts val="1600"/>
+                <a:buFont typeface="Arial"/>
+                <a:buNone/>
+              </a:pPr>
+              <a:r>
+                <a:rPr lang="en" sz="1600" b="1" i="0" u="none" strike="noStrike" cap="none" dirty="0">
+                  <a:solidFill>
+                    <a:srgbClr val="000000"/>
+                  </a:solidFill>
+                  <a:latin typeface="Arial"/>
+                  <a:ea typeface="Arial"/>
+                  <a:cs typeface="Arial"/>
+                  <a:sym typeface="Arial"/>
+                </a:rPr>
+                <a:t>k</a:t>
+              </a:r>
+              <a:endParaRPr sz="1600" b="1" i="0" u="none" strike="noStrike" cap="none" dirty="0">
+                <a:solidFill>
+                  <a:srgbClr val="000000"/>
+                </a:solidFill>
+                <a:latin typeface="Arial"/>
+                <a:ea typeface="Arial"/>
+                <a:cs typeface="Arial"/>
+                <a:sym typeface="Arial"/>
+              </a:endParaRPr>
+            </a:p>
+          </p:txBody>
+        </p:sp>
+        <p:pic>
+          <p:nvPicPr>
+            <p:cNvPr id="11" name="Picture 10">
+              <a:extLst>
+                <a:ext uri="{FF2B5EF4-FFF2-40B4-BE49-F238E27FC236}">
+                  <a16:creationId xmlns:a16="http://schemas.microsoft.com/office/drawing/2014/main" id="{007002DF-CCB6-4327-F8C8-AE5D400BB31D}"/>
+                </a:ext>
+              </a:extLst>
+            </p:cNvPr>
+            <p:cNvPicPr>
+              <a:picLocks noChangeAspect="1"/>
+            </p:cNvPicPr>
+            <p:nvPr/>
+          </p:nvPicPr>
+          <p:blipFill>
+            <a:blip r:embed="rId15"/>
+            <a:stretch>
+              <a:fillRect/>
+            </a:stretch>
+          </p:blipFill>
+          <p:spPr>
+            <a:xfrm>
+              <a:off x="2625561" y="9293630"/>
+              <a:ext cx="2903431" cy="930658"/>
+            </a:xfrm>
+            <a:prstGeom prst="rect">
+              <a:avLst/>
+            </a:prstGeom>
+          </p:spPr>
+        </p:pic>
+      </p:grpSp>
     </p:spTree>
   </p:cSld>
   <p:clrMapOvr>
@@ -10518,7 +10509,7 @@
                 <a:cs typeface="Arial"/>
                 <a:sym typeface="Arial"/>
               </a:rPr>
-              <a:t>(h</a:t>
+              <a:t>(h)</a:t>
             </a:r>
             <a:r>
               <a:rPr lang="en" sz="1100" b="0" i="0" u="none" strike="noStrike" cap="none" dirty="0">
@@ -10530,7 +10521,7 @@
                 <a:cs typeface="Arial"/>
                 <a:sym typeface="Arial"/>
               </a:rPr>
-              <a:t>), and platform-preferential </a:t>
+              <a:t>, and platform-preferential </a:t>
             </a:r>
             <a:r>
               <a:rPr lang="en" sz="1100" b="1" i="0" u="none" strike="noStrike" cap="none" dirty="0">
@@ -10626,10 +10617,10 @@
                 <a:cs typeface="Arial"/>
                 <a:sym typeface="Arial"/>
               </a:rPr>
-              <a:t> Example of two </a:t>
+              <a:t> </a:t>
             </a:r>
             <a:r>
-              <a:rPr lang="en" sz="1100" b="0" i="1" u="none" strike="noStrike" cap="none" dirty="0">
+              <a:rPr lang="en-US" sz="1100" b="0" i="0" u="none" strike="noStrike" cap="none" dirty="0">
                 <a:solidFill>
                   <a:schemeClr val="dk1"/>
                 </a:solidFill>
@@ -10638,7 +10629,31 @@
                 <a:cs typeface="Arial"/>
                 <a:sym typeface="Arial"/>
               </a:rPr>
-              <a:t>de novo</a:t>
+              <a:t>Example of two de novo isoforms in Manatee validated through isoform-specific PCR amplification. Purple corresponds to the designed primers, orange to the possible amplification product associated to </a:t>
+            </a:r>
+            <a:r>
+              <a:rPr lang="en-US" sz="1100" b="0" i="0" u="none" strike="noStrike" cap="none">
+                <a:solidFill>
+                  <a:schemeClr val="dk1"/>
+                </a:solidFill>
+                <a:latin typeface="Arial"/>
+                <a:ea typeface="Arial"/>
+                <a:cs typeface="Arial"/>
+                <a:sym typeface="Arial"/>
+              </a:rPr>
+              <a:t>one isoform</a:t>
+            </a:r>
+            <a:r>
+              <a:rPr lang="en-US" sz="1100" b="0" i="0" u="none" strike="noStrike" cap="none" dirty="0">
+                <a:solidFill>
+                  <a:schemeClr val="dk1"/>
+                </a:solidFill>
+                <a:latin typeface="Arial"/>
+                <a:ea typeface="Arial"/>
+                <a:cs typeface="Arial"/>
+                <a:sym typeface="Arial"/>
+              </a:rPr>
+              <a:t>, and black to the predicted isoforms.</a:t>
             </a:r>
             <a:r>
               <a:rPr lang="en" sz="1100" b="0" i="0" u="none" strike="noStrike" cap="none" dirty="0">
@@ -10650,7 +10665,15 @@
                 <a:cs typeface="Arial"/>
                 <a:sym typeface="Arial"/>
               </a:rPr>
-              <a:t> isoforms in Manatee validated through isoform-specific PCR amplification, blue corresponds to supported transcripts and red to unsupported transcripts. </a:t>
+              <a:t> </a:t>
+            </a:r>
+            <a:r>
+              <a:rPr lang="en" sz="1100" b="1" dirty="0">
+                <a:solidFill>
+                  <a:schemeClr val="dk1"/>
+                </a:solidFill>
+              </a:rPr>
+              <a:t>l</a:t>
             </a:r>
             <a:r>
               <a:rPr lang="en" sz="1100" b="1" i="0" u="none" strike="noStrike" cap="none" dirty="0">
@@ -10662,10 +10685,10 @@
                 <a:cs typeface="Arial"/>
                 <a:sym typeface="Arial"/>
               </a:rPr>
-              <a:t>l)</a:t>
+              <a:t>)</a:t>
             </a:r>
             <a:r>
-              <a:rPr lang="en" sz="1100" b="0" i="0" u="none" strike="noStrike" cap="none" dirty="0">
+              <a:rPr lang="en-US" sz="1100" b="0" i="0" u="none" strike="noStrike" cap="none" dirty="0">
                 <a:solidFill>
                   <a:schemeClr val="dk1"/>
                 </a:solidFill>
@@ -10674,7 +10697,7 @@
                 <a:cs typeface="Arial"/>
                 <a:sym typeface="Arial"/>
               </a:rPr>
-              <a:t> PCR validation results for manatee isoforms for seven target genes.</a:t>
+              <a:t> PCR validation results for manatee isoforms for seven target genes. Blue corresponds to supported transcripts and red to unsupported transcripts.</a:t>
             </a:r>
             <a:endParaRPr sz="1100" b="0" i="0" u="none" strike="noStrike" cap="none" dirty="0">
               <a:solidFill>

</xml_diff>

<commit_message>
tried to fixed images that PPT made fuzzy, but as some were fixed, others were made fuzzy
</commit_message>
<xml_diff>
--- a/main_figures/Figures_Validation.pptx
+++ b/main_figures/Figures_Validation.pptx
@@ -8847,123 +8847,222 @@
           <a:chExt cx="0" cy="0"/>
         </a:xfrm>
       </p:grpSpPr>
-      <p:grpSp>
-        <p:nvGrpSpPr>
-          <p:cNvPr id="12" name="Group 11">
+      <p:pic>
+        <p:nvPicPr>
+          <p:cNvPr id="34" name="Picture 33">
             <a:extLst>
               <a:ext uri="{FF2B5EF4-FFF2-40B4-BE49-F238E27FC236}">
-                <a16:creationId xmlns:a16="http://schemas.microsoft.com/office/drawing/2014/main" id="{9A5AF488-1DE4-14A7-CD44-9C7AFE0BBC7E}"/>
+                <a16:creationId xmlns:a16="http://schemas.microsoft.com/office/drawing/2014/main" id="{ABEE2178-7BA7-D179-9908-704357F3022E}"/>
               </a:ext>
             </a:extLst>
           </p:cNvPr>
-          <p:cNvGrpSpPr/>
+          <p:cNvPicPr>
+            <a:picLocks noChangeAspect="1"/>
+          </p:cNvPicPr>
           <p:nvPr/>
-        </p:nvGrpSpPr>
-        <p:grpSpPr>
+        </p:nvPicPr>
+        <p:blipFill>
+          <a:blip r:embed="rId3"/>
+          <a:stretch>
+            <a:fillRect/>
+          </a:stretch>
+        </p:blipFill>
+        <p:spPr>
           <a:xfrm>
-            <a:off x="3963920" y="74675"/>
-            <a:ext cx="3204976" cy="1087401"/>
-            <a:chOff x="3963920" y="74675"/>
-            <a:chExt cx="3204976" cy="1087401"/>
+            <a:off x="4965192" y="6025896"/>
+            <a:ext cx="2359152" cy="2677957"/>
           </a:xfrm>
-        </p:grpSpPr>
-        <p:pic>
-          <p:nvPicPr>
-            <p:cNvPr id="6" name="Picture 5">
-              <a:extLst>
-                <a:ext uri="{FF2B5EF4-FFF2-40B4-BE49-F238E27FC236}">
-                  <a16:creationId xmlns:a16="http://schemas.microsoft.com/office/drawing/2014/main" id="{63E5955B-FDB0-BB74-EAAC-FF1B9F028D5B}"/>
-                </a:ext>
-              </a:extLst>
-            </p:cNvPr>
-            <p:cNvPicPr>
-              <a:picLocks noChangeAspect="1"/>
-            </p:cNvPicPr>
-            <p:nvPr/>
-          </p:nvPicPr>
-          <p:blipFill>
-            <a:blip r:embed="rId3"/>
-            <a:stretch>
-              <a:fillRect/>
-            </a:stretch>
-          </p:blipFill>
-          <p:spPr>
-            <a:xfrm>
-              <a:off x="4123944" y="164592"/>
-              <a:ext cx="3044952" cy="997484"/>
-            </a:xfrm>
-            <a:prstGeom prst="rect">
-              <a:avLst/>
-            </a:prstGeom>
-          </p:spPr>
-        </p:pic>
-        <p:sp>
-          <p:nvSpPr>
-            <p:cNvPr id="101" name="Google Shape;101;g24e8104fe94_0_0"/>
-            <p:cNvSpPr txBox="1"/>
-            <p:nvPr/>
-          </p:nvSpPr>
-          <p:spPr>
-            <a:xfrm>
-              <a:off x="3963920" y="74675"/>
-              <a:ext cx="281100" cy="400200"/>
-            </a:xfrm>
-            <a:prstGeom prst="rect">
-              <a:avLst/>
-            </a:prstGeom>
+          <a:prstGeom prst="rect">
+            <a:avLst/>
+          </a:prstGeom>
+        </p:spPr>
+      </p:pic>
+      <p:pic>
+        <p:nvPicPr>
+          <p:cNvPr id="32" name="Picture 31">
+            <a:extLst>
+              <a:ext uri="{FF2B5EF4-FFF2-40B4-BE49-F238E27FC236}">
+                <a16:creationId xmlns:a16="http://schemas.microsoft.com/office/drawing/2014/main" id="{F798C300-8E50-1E2F-57F4-90EF8811E376}"/>
+              </a:ext>
+            </a:extLst>
+          </p:cNvPr>
+          <p:cNvPicPr>
+            <a:picLocks noChangeAspect="1"/>
+          </p:cNvPicPr>
+          <p:nvPr/>
+        </p:nvPicPr>
+        <p:blipFill>
+          <a:blip r:embed="rId4"/>
+          <a:stretch>
+            <a:fillRect/>
+          </a:stretch>
+        </p:blipFill>
+        <p:spPr>
+          <a:xfrm>
+            <a:off x="2569464" y="6025896"/>
+            <a:ext cx="2461260" cy="2687955"/>
+          </a:xfrm>
+          <a:prstGeom prst="rect">
+            <a:avLst/>
+          </a:prstGeom>
+        </p:spPr>
+      </p:pic>
+      <p:pic>
+        <p:nvPicPr>
+          <p:cNvPr id="24" name="Picture 23">
+            <a:extLst>
+              <a:ext uri="{FF2B5EF4-FFF2-40B4-BE49-F238E27FC236}">
+                <a16:creationId xmlns:a16="http://schemas.microsoft.com/office/drawing/2014/main" id="{C8110257-2335-7657-2ED3-FC76934A91B5}"/>
+              </a:ext>
+            </a:extLst>
+          </p:cNvPr>
+          <p:cNvPicPr>
+            <a:picLocks noChangeAspect="1"/>
+          </p:cNvPicPr>
+          <p:nvPr/>
+        </p:nvPicPr>
+        <p:blipFill>
+          <a:blip r:embed="rId5"/>
+          <a:stretch>
+            <a:fillRect/>
+          </a:stretch>
+        </p:blipFill>
+        <p:spPr>
+          <a:xfrm>
+            <a:off x="310896" y="5934456"/>
+            <a:ext cx="2441448" cy="2681697"/>
+          </a:xfrm>
+          <a:prstGeom prst="rect">
+            <a:avLst/>
+          </a:prstGeom>
+        </p:spPr>
+      </p:pic>
+      <p:pic>
+        <p:nvPicPr>
+          <p:cNvPr id="15" name="Picture 14">
+            <a:extLst>
+              <a:ext uri="{FF2B5EF4-FFF2-40B4-BE49-F238E27FC236}">
+                <a16:creationId xmlns:a16="http://schemas.microsoft.com/office/drawing/2014/main" id="{8B6842CE-CE7C-36A3-EBD6-AE76B3F9DCFF}"/>
+              </a:ext>
+            </a:extLst>
+          </p:cNvPr>
+          <p:cNvPicPr>
+            <a:picLocks noChangeAspect="1"/>
+          </p:cNvPicPr>
+          <p:nvPr/>
+        </p:nvPicPr>
+        <p:blipFill>
+          <a:blip r:embed="rId6"/>
+          <a:stretch>
+            <a:fillRect/>
+          </a:stretch>
+        </p:blipFill>
+        <p:spPr>
+          <a:xfrm>
+            <a:off x="4068850" y="284016"/>
+            <a:ext cx="3122102" cy="1022758"/>
+          </a:xfrm>
+          <a:prstGeom prst="rect">
+            <a:avLst/>
+          </a:prstGeom>
+        </p:spPr>
+      </p:pic>
+      <p:pic>
+        <p:nvPicPr>
+          <p:cNvPr id="7" name="Picture 6">
+            <a:extLst>
+              <a:ext uri="{FF2B5EF4-FFF2-40B4-BE49-F238E27FC236}">
+                <a16:creationId xmlns:a16="http://schemas.microsoft.com/office/drawing/2014/main" id="{58F1E484-8517-B94A-4719-79008F08B880}"/>
+              </a:ext>
+            </a:extLst>
+          </p:cNvPr>
+          <p:cNvPicPr>
+            <a:picLocks noChangeAspect="1"/>
+          </p:cNvPicPr>
+          <p:nvPr/>
+        </p:nvPicPr>
+        <p:blipFill>
+          <a:blip r:embed="rId7"/>
+          <a:stretch>
+            <a:fillRect/>
+          </a:stretch>
+        </p:blipFill>
+        <p:spPr>
+          <a:xfrm>
+            <a:off x="201250" y="403755"/>
+            <a:ext cx="3771392" cy="2121408"/>
+          </a:xfrm>
+          <a:prstGeom prst="rect">
+            <a:avLst/>
+          </a:prstGeom>
+        </p:spPr>
+      </p:pic>
+      <p:sp>
+        <p:nvSpPr>
+          <p:cNvPr id="101" name="Google Shape;101;g24e8104fe94_0_0"/>
+          <p:cNvSpPr txBox="1"/>
+          <p:nvPr/>
+        </p:nvSpPr>
+        <p:spPr>
+          <a:xfrm>
+            <a:off x="3958922" y="94973"/>
+            <a:ext cx="281100" cy="400200"/>
+          </a:xfrm>
+          <a:prstGeom prst="rect">
+            <a:avLst/>
+          </a:prstGeom>
+          <a:noFill/>
+          <a:ln>
             <a:noFill/>
-            <a:ln>
-              <a:noFill/>
-            </a:ln>
-          </p:spPr>
-          <p:txBody>
-            <a:bodyPr spcFirstLastPara="1" wrap="square" lIns="91425" tIns="91425" rIns="91425" bIns="91425" anchor="t" anchorCtr="0">
-              <a:spAutoFit/>
-            </a:bodyPr>
-            <a:lstStyle/>
-            <a:p>
-              <a:pPr marL="0" marR="0" lvl="0" indent="0" algn="l" rtl="0">
-                <a:lnSpc>
-                  <a:spcPct val="100000"/>
-                </a:lnSpc>
-                <a:spcBef>
-                  <a:spcPts val="0"/>
-                </a:spcBef>
-                <a:spcAft>
-                  <a:spcPts val="0"/>
-                </a:spcAft>
-                <a:buClr>
+          </a:ln>
+        </p:spPr>
+        <p:txBody>
+          <a:bodyPr spcFirstLastPara="1" wrap="square" lIns="91425" tIns="91425" rIns="91425" bIns="91425" anchor="t" anchorCtr="0">
+            <a:spAutoFit/>
+          </a:bodyPr>
+          <a:lstStyle/>
+          <a:p>
+            <a:pPr marL="0" marR="0" lvl="0" indent="0" algn="l" rtl="0">
+              <a:lnSpc>
+                <a:spcPct val="100000"/>
+              </a:lnSpc>
+              <a:spcBef>
+                <a:spcPts val="0"/>
+              </a:spcBef>
+              <a:spcAft>
+                <a:spcPts val="0"/>
+              </a:spcAft>
+              <a:buClr>
+                <a:srgbClr val="000000"/>
+              </a:buClr>
+              <a:buSzPts val="1400"/>
+              <a:buFont typeface="Arial"/>
+              <a:buNone/>
+            </a:pPr>
+            <a:r>
+              <a:rPr lang="en" sz="1400" b="1" i="0" u="none" strike="noStrike" cap="none" dirty="0">
+                <a:solidFill>
                   <a:srgbClr val="000000"/>
-                </a:buClr>
-                <a:buSzPts val="1400"/>
-                <a:buFont typeface="Arial"/>
-                <a:buNone/>
-              </a:pPr>
-              <a:r>
-                <a:rPr lang="en" sz="1400" b="1" i="0" u="none" strike="noStrike" cap="none" dirty="0">
-                  <a:solidFill>
-                    <a:srgbClr val="000000"/>
-                  </a:solidFill>
-                  <a:latin typeface="Arial"/>
-                  <a:ea typeface="Arial"/>
-                  <a:cs typeface="Arial"/>
-                  <a:sym typeface="Arial"/>
-                </a:rPr>
-                <a:t>b</a:t>
-              </a:r>
-              <a:endParaRPr sz="1400" b="1" i="0" u="none" strike="noStrike" cap="none" dirty="0">
-                <a:solidFill>
-                  <a:srgbClr val="000000"/>
-                </a:solidFill>
-                <a:latin typeface="Arial"/>
-                <a:ea typeface="Arial"/>
-                <a:cs typeface="Arial"/>
-                <a:sym typeface="Arial"/>
-              </a:endParaRPr>
-            </a:p>
-          </p:txBody>
-        </p:sp>
-      </p:grpSp>
+                </a:solidFill>
+                <a:latin typeface="Arial"/>
+                <a:ea typeface="Arial"/>
+                <a:cs typeface="Arial"/>
+                <a:sym typeface="Arial"/>
+              </a:rPr>
+              <a:t>b</a:t>
+            </a:r>
+            <a:endParaRPr sz="1400" b="1" i="0" u="none" strike="noStrike" cap="none" dirty="0">
+              <a:solidFill>
+                <a:srgbClr val="000000"/>
+              </a:solidFill>
+              <a:latin typeface="Arial"/>
+              <a:ea typeface="Arial"/>
+              <a:cs typeface="Arial"/>
+              <a:sym typeface="Arial"/>
+            </a:endParaRPr>
+          </a:p>
+        </p:txBody>
+      </p:sp>
       <p:pic>
         <p:nvPicPr>
           <p:cNvPr id="10" name="Picture 9">
@@ -8979,7 +9078,7 @@
           <p:nvPr/>
         </p:nvPicPr>
         <p:blipFill rotWithShape="1">
-          <a:blip r:embed="rId4"/>
+          <a:blip r:embed="rId8"/>
           <a:srcRect l="15861" r="29099" b="2674"/>
           <a:stretch/>
         </p:blipFill>
@@ -9008,13 +9107,13 @@
           <p:nvPr/>
         </p:nvPicPr>
         <p:blipFill rotWithShape="1">
-          <a:blip r:embed="rId5"/>
+          <a:blip r:embed="rId9"/>
           <a:srcRect l="14010" r="27474" b="3666"/>
           <a:stretch/>
         </p:blipFill>
         <p:spPr>
           <a:xfrm>
-            <a:off x="377914" y="3522839"/>
+            <a:off x="384545" y="3436478"/>
             <a:ext cx="2183087" cy="2114107"/>
           </a:xfrm>
           <a:prstGeom prst="rect">
@@ -9022,122 +9121,101 @@
           </a:prstGeom>
         </p:spPr>
       </p:pic>
-      <p:grpSp>
-        <p:nvGrpSpPr>
-          <p:cNvPr id="30" name="Group 29">
+      <p:pic>
+        <p:nvPicPr>
+          <p:cNvPr id="18" name="Picture 17">
             <a:extLst>
               <a:ext uri="{FF2B5EF4-FFF2-40B4-BE49-F238E27FC236}">
-                <a16:creationId xmlns:a16="http://schemas.microsoft.com/office/drawing/2014/main" id="{F3FE8B8E-CEBB-720E-379D-D451FBC8AE2F}"/>
+                <a16:creationId xmlns:a16="http://schemas.microsoft.com/office/drawing/2014/main" id="{A19434DB-7F71-D1ED-744A-C4D06FD61F5F}"/>
               </a:ext>
             </a:extLst>
           </p:cNvPr>
-          <p:cNvGrpSpPr/>
+          <p:cNvPicPr>
+            <a:picLocks noChangeAspect="1"/>
+          </p:cNvPicPr>
           <p:nvPr/>
-        </p:nvGrpSpPr>
-        <p:grpSpPr>
+        </p:nvPicPr>
+        <p:blipFill rotWithShape="1">
+          <a:blip r:embed="rId10"/>
+          <a:srcRect t="21690" b="22769"/>
+          <a:stretch/>
+        </p:blipFill>
+        <p:spPr>
+          <a:xfrm>
+            <a:off x="153713" y="9206438"/>
+            <a:ext cx="2377440" cy="1320454"/>
+          </a:xfrm>
+          <a:prstGeom prst="rect">
+            <a:avLst/>
+          </a:prstGeom>
+        </p:spPr>
+      </p:pic>
+      <p:sp>
+        <p:nvSpPr>
+          <p:cNvPr id="91" name="Google Shape;91;g24e8104fe94_0_0"/>
+          <p:cNvSpPr txBox="1"/>
+          <p:nvPr/>
+        </p:nvSpPr>
+        <p:spPr>
           <a:xfrm>
             <a:off x="91027" y="8996908"/>
-            <a:ext cx="2440126" cy="1529984"/>
-            <a:chOff x="120875" y="8992950"/>
-            <a:chExt cx="2440126" cy="1529984"/>
+            <a:ext cx="281100" cy="431100"/>
           </a:xfrm>
-        </p:grpSpPr>
-        <p:pic>
-          <p:nvPicPr>
-            <p:cNvPr id="18" name="Picture 17">
-              <a:extLst>
-                <a:ext uri="{FF2B5EF4-FFF2-40B4-BE49-F238E27FC236}">
-                  <a16:creationId xmlns:a16="http://schemas.microsoft.com/office/drawing/2014/main" id="{A19434DB-7F71-D1ED-744A-C4D06FD61F5F}"/>
-                </a:ext>
-              </a:extLst>
-            </p:cNvPr>
-            <p:cNvPicPr>
-              <a:picLocks noChangeAspect="1"/>
-            </p:cNvPicPr>
-            <p:nvPr/>
-          </p:nvPicPr>
-          <p:blipFill rotWithShape="1">
-            <a:blip r:embed="rId6"/>
-            <a:srcRect t="21690" b="22769"/>
-            <a:stretch/>
-          </p:blipFill>
-          <p:spPr>
-            <a:xfrm>
-              <a:off x="183561" y="9202480"/>
-              <a:ext cx="2377440" cy="1320454"/>
-            </a:xfrm>
-            <a:prstGeom prst="rect">
-              <a:avLst/>
-            </a:prstGeom>
-          </p:spPr>
-        </p:pic>
-        <p:sp>
-          <p:nvSpPr>
-            <p:cNvPr id="91" name="Google Shape;91;g24e8104fe94_0_0"/>
-            <p:cNvSpPr txBox="1"/>
-            <p:nvPr/>
-          </p:nvSpPr>
-          <p:spPr>
-            <a:xfrm>
-              <a:off x="120875" y="8992950"/>
-              <a:ext cx="281100" cy="431100"/>
-            </a:xfrm>
-            <a:prstGeom prst="rect">
-              <a:avLst/>
-            </a:prstGeom>
+          <a:prstGeom prst="rect">
+            <a:avLst/>
+          </a:prstGeom>
+          <a:noFill/>
+          <a:ln>
             <a:noFill/>
-            <a:ln>
-              <a:noFill/>
-            </a:ln>
-          </p:spPr>
-          <p:txBody>
-            <a:bodyPr spcFirstLastPara="1" wrap="square" lIns="91425" tIns="91425" rIns="91425" bIns="91425" anchor="t" anchorCtr="0">
-              <a:spAutoFit/>
-            </a:bodyPr>
-            <a:lstStyle/>
-            <a:p>
-              <a:pPr marL="0" marR="0" lvl="0" indent="0" algn="l" rtl="0">
-                <a:lnSpc>
-                  <a:spcPct val="100000"/>
-                </a:lnSpc>
-                <a:spcBef>
-                  <a:spcPts val="0"/>
-                </a:spcBef>
-                <a:spcAft>
-                  <a:spcPts val="0"/>
-                </a:spcAft>
-                <a:buClr>
+          </a:ln>
+        </p:spPr>
+        <p:txBody>
+          <a:bodyPr spcFirstLastPara="1" wrap="square" lIns="91425" tIns="91425" rIns="91425" bIns="91425" anchor="t" anchorCtr="0">
+            <a:spAutoFit/>
+          </a:bodyPr>
+          <a:lstStyle/>
+          <a:p>
+            <a:pPr marL="0" marR="0" lvl="0" indent="0" algn="l" rtl="0">
+              <a:lnSpc>
+                <a:spcPct val="100000"/>
+              </a:lnSpc>
+              <a:spcBef>
+                <a:spcPts val="0"/>
+              </a:spcBef>
+              <a:spcAft>
+                <a:spcPts val="0"/>
+              </a:spcAft>
+              <a:buClr>
+                <a:srgbClr val="000000"/>
+              </a:buClr>
+              <a:buSzPts val="1600"/>
+              <a:buFont typeface="Arial"/>
+              <a:buNone/>
+            </a:pPr>
+            <a:r>
+              <a:rPr lang="en" sz="1600" b="1" i="0" u="none" strike="noStrike" cap="none" dirty="0">
+                <a:solidFill>
                   <a:srgbClr val="000000"/>
-                </a:buClr>
-                <a:buSzPts val="1600"/>
-                <a:buFont typeface="Arial"/>
-                <a:buNone/>
-              </a:pPr>
-              <a:r>
-                <a:rPr lang="en" sz="1600" b="1" i="0" u="none" strike="noStrike" cap="none" dirty="0">
-                  <a:solidFill>
-                    <a:srgbClr val="000000"/>
-                  </a:solidFill>
-                  <a:latin typeface="Arial"/>
-                  <a:ea typeface="Arial"/>
-                  <a:cs typeface="Arial"/>
-                  <a:sym typeface="Arial"/>
-                </a:rPr>
-                <a:t>j</a:t>
-              </a:r>
-              <a:endParaRPr sz="1600" b="1" i="0" u="none" strike="noStrike" cap="none" dirty="0">
-                <a:solidFill>
-                  <a:srgbClr val="000000"/>
-                </a:solidFill>
-                <a:latin typeface="Arial"/>
-                <a:ea typeface="Arial"/>
-                <a:cs typeface="Arial"/>
-                <a:sym typeface="Arial"/>
-              </a:endParaRPr>
-            </a:p>
-          </p:txBody>
-        </p:sp>
-      </p:grpSp>
+                </a:solidFill>
+                <a:latin typeface="Arial"/>
+                <a:ea typeface="Arial"/>
+                <a:cs typeface="Arial"/>
+                <a:sym typeface="Arial"/>
+              </a:rPr>
+              <a:t>j</a:t>
+            </a:r>
+            <a:endParaRPr sz="1600" b="1" i="0" u="none" strike="noStrike" cap="none" dirty="0">
+              <a:solidFill>
+                <a:srgbClr val="000000"/>
+              </a:solidFill>
+              <a:latin typeface="Arial"/>
+              <a:ea typeface="Arial"/>
+              <a:cs typeface="Arial"/>
+              <a:sym typeface="Arial"/>
+            </a:endParaRPr>
+          </a:p>
+        </p:txBody>
+      </p:sp>
       <p:sp>
         <p:nvSpPr>
           <p:cNvPr id="93" name="Google Shape;93;g24e8104fe94_0_0"/>
@@ -9354,114 +9432,50 @@
           </a:p>
         </p:txBody>
       </p:sp>
-      <p:grpSp>
-        <p:nvGrpSpPr>
-          <p:cNvPr id="25" name="Group 24">
-            <a:extLst>
-              <a:ext uri="{FF2B5EF4-FFF2-40B4-BE49-F238E27FC236}">
-                <a16:creationId xmlns:a16="http://schemas.microsoft.com/office/drawing/2014/main" id="{D1064483-17D8-4E0E-F78E-7CF428173160}"/>
-              </a:ext>
-            </a:extLst>
-          </p:cNvPr>
-          <p:cNvGrpSpPr/>
+      <p:sp>
+        <p:nvSpPr>
+          <p:cNvPr id="96" name="Google Shape;96;g24e8104fe94_0_0"/>
+          <p:cNvSpPr txBox="1"/>
           <p:nvPr/>
-        </p:nvGrpSpPr>
-        <p:grpSpPr>
+        </p:nvSpPr>
+        <p:spPr>
           <a:xfrm>
             <a:off x="120875" y="5812163"/>
-            <a:ext cx="2583366" cy="3184745"/>
-            <a:chOff x="120875" y="5812163"/>
-            <a:chExt cx="2583366" cy="3184745"/>
+            <a:ext cx="281100" cy="400200"/>
           </a:xfrm>
-        </p:grpSpPr>
-        <p:pic>
-          <p:nvPicPr>
-            <p:cNvPr id="19" name="Picture 18">
-              <a:extLst>
-                <a:ext uri="{FF2B5EF4-FFF2-40B4-BE49-F238E27FC236}">
-                  <a16:creationId xmlns:a16="http://schemas.microsoft.com/office/drawing/2014/main" id="{1D81D358-138A-C8B7-0A0C-4546B5ADC8D9}"/>
-                </a:ext>
-              </a:extLst>
-            </p:cNvPr>
-            <p:cNvPicPr>
-              <a:picLocks noChangeAspect="1"/>
-            </p:cNvPicPr>
-            <p:nvPr/>
-          </p:nvPicPr>
-          <p:blipFill>
-            <a:blip r:embed="rId7"/>
-            <a:stretch>
-              <a:fillRect/>
-            </a:stretch>
-          </p:blipFill>
-          <p:spPr>
-            <a:xfrm>
-              <a:off x="309692" y="5933668"/>
-              <a:ext cx="2394549" cy="3063240"/>
-            </a:xfrm>
-            <a:prstGeom prst="rect">
-              <a:avLst/>
-            </a:prstGeom>
-          </p:spPr>
-        </p:pic>
-        <p:sp>
-          <p:nvSpPr>
-            <p:cNvPr id="96" name="Google Shape;96;g24e8104fe94_0_0"/>
-            <p:cNvSpPr txBox="1"/>
-            <p:nvPr/>
-          </p:nvSpPr>
-          <p:spPr>
-            <a:xfrm>
-              <a:off x="120875" y="5812163"/>
-              <a:ext cx="281100" cy="400200"/>
-            </a:xfrm>
-            <a:prstGeom prst="rect">
-              <a:avLst/>
-            </a:prstGeom>
+          <a:prstGeom prst="rect">
+            <a:avLst/>
+          </a:prstGeom>
+          <a:noFill/>
+          <a:ln>
             <a:noFill/>
-            <a:ln>
-              <a:noFill/>
-            </a:ln>
-          </p:spPr>
-          <p:txBody>
-            <a:bodyPr spcFirstLastPara="1" wrap="square" lIns="91425" tIns="91425" rIns="91425" bIns="91425" anchor="t" anchorCtr="0">
-              <a:spAutoFit/>
-            </a:bodyPr>
-            <a:lstStyle/>
-            <a:p>
-              <a:pPr marL="0" marR="0" lvl="0" indent="0" algn="l" rtl="0">
-                <a:lnSpc>
-                  <a:spcPct val="100000"/>
-                </a:lnSpc>
-                <a:spcBef>
-                  <a:spcPts val="0"/>
-                </a:spcBef>
-                <a:spcAft>
-                  <a:spcPts val="0"/>
-                </a:spcAft>
-                <a:buClr>
-                  <a:srgbClr val="000000"/>
-                </a:buClr>
-                <a:buSzPts val="1400"/>
-                <a:buFont typeface="Arial"/>
-                <a:buNone/>
-              </a:pPr>
-              <a:r>
-                <a:rPr lang="en" sz="1400" b="1" i="0" u="none" strike="noStrike" cap="none">
-                  <a:solidFill>
-                    <a:srgbClr val="000000"/>
-                  </a:solidFill>
-                  <a:highlight>
-                    <a:schemeClr val="lt1"/>
-                  </a:highlight>
-                  <a:latin typeface="Arial"/>
-                  <a:ea typeface="Arial"/>
-                  <a:cs typeface="Arial"/>
-                  <a:sym typeface="Arial"/>
-                </a:rPr>
-                <a:t>g</a:t>
-              </a:r>
-              <a:endParaRPr sz="1400" b="1" i="0" u="none" strike="noStrike" cap="none">
+          </a:ln>
+        </p:spPr>
+        <p:txBody>
+          <a:bodyPr spcFirstLastPara="1" wrap="square" lIns="91425" tIns="91425" rIns="91425" bIns="91425" anchor="t" anchorCtr="0">
+            <a:spAutoFit/>
+          </a:bodyPr>
+          <a:lstStyle/>
+          <a:p>
+            <a:pPr marL="0" marR="0" lvl="0" indent="0" algn="l" rtl="0">
+              <a:lnSpc>
+                <a:spcPct val="100000"/>
+              </a:lnSpc>
+              <a:spcBef>
+                <a:spcPts val="0"/>
+              </a:spcBef>
+              <a:spcAft>
+                <a:spcPts val="0"/>
+              </a:spcAft>
+              <a:buClr>
+                <a:srgbClr val="000000"/>
+              </a:buClr>
+              <a:buSzPts val="1400"/>
+              <a:buFont typeface="Arial"/>
+              <a:buNone/>
+            </a:pPr>
+            <a:r>
+              <a:rPr lang="en" sz="1400" b="1" i="0" u="none" strike="noStrike" cap="none">
                 <a:solidFill>
                   <a:srgbClr val="000000"/>
                 </a:solidFill>
@@ -9472,11 +9486,24 @@
                 <a:ea typeface="Arial"/>
                 <a:cs typeface="Arial"/>
                 <a:sym typeface="Arial"/>
-              </a:endParaRPr>
-            </a:p>
-          </p:txBody>
-        </p:sp>
-      </p:grpSp>
+              </a:rPr>
+              <a:t>g</a:t>
+            </a:r>
+            <a:endParaRPr sz="1400" b="1" i="0" u="none" strike="noStrike" cap="none">
+              <a:solidFill>
+                <a:srgbClr val="000000"/>
+              </a:solidFill>
+              <a:highlight>
+                <a:schemeClr val="lt1"/>
+              </a:highlight>
+              <a:latin typeface="Arial"/>
+              <a:ea typeface="Arial"/>
+              <a:cs typeface="Arial"/>
+              <a:sym typeface="Arial"/>
+            </a:endParaRPr>
+          </a:p>
+        </p:txBody>
+      </p:sp>
       <p:sp>
         <p:nvSpPr>
           <p:cNvPr id="100" name="Google Shape;100;g24e8104fe94_0_0"/>
@@ -9485,7 +9512,7 @@
         </p:nvSpPr>
         <p:spPr>
           <a:xfrm>
-            <a:off x="5733800" y="9044588"/>
+            <a:off x="5713478" y="9004644"/>
             <a:ext cx="281100" cy="431100"/>
           </a:xfrm>
           <a:prstGeom prst="rect">
@@ -9520,7 +9547,7 @@
               <a:buNone/>
             </a:pPr>
             <a:r>
-              <a:rPr lang="en" sz="1600" b="1" i="0" u="none" strike="noStrike" cap="none">
+              <a:rPr lang="en" sz="1600" b="1" i="0" u="none" strike="noStrike" cap="none" dirty="0">
                 <a:solidFill>
                   <a:srgbClr val="000000"/>
                 </a:solidFill>
@@ -9531,7 +9558,7 @@
               </a:rPr>
               <a:t>l</a:t>
             </a:r>
-            <a:endParaRPr sz="1600" b="1" i="0" u="none" strike="noStrike" cap="none">
+            <a:endParaRPr sz="1600" b="1" i="0" u="none" strike="noStrike" cap="none" dirty="0">
               <a:solidFill>
                 <a:srgbClr val="000000"/>
               </a:solidFill>
@@ -9543,120 +9570,72 @@
           </a:p>
         </p:txBody>
       </p:sp>
-      <p:grpSp>
-        <p:nvGrpSpPr>
-          <p:cNvPr id="8" name="Group 7">
-            <a:extLst>
-              <a:ext uri="{FF2B5EF4-FFF2-40B4-BE49-F238E27FC236}">
-                <a16:creationId xmlns:a16="http://schemas.microsoft.com/office/drawing/2014/main" id="{A084C79C-98BD-C650-66AB-5FE7C8930C95}"/>
-              </a:ext>
-            </a:extLst>
-          </p:cNvPr>
-          <p:cNvGrpSpPr/>
+      <p:sp>
+        <p:nvSpPr>
+          <p:cNvPr id="92" name="Google Shape;92;g24e8104fe94_0_0"/>
+          <p:cNvSpPr txBox="1"/>
           <p:nvPr/>
-        </p:nvGrpSpPr>
-        <p:grpSpPr>
+        </p:nvSpPr>
+        <p:spPr>
           <a:xfrm>
             <a:off x="60700" y="74675"/>
-            <a:ext cx="3903220" cy="2506974"/>
-            <a:chOff x="60700" y="74675"/>
-            <a:chExt cx="3903220" cy="2506974"/>
+            <a:ext cx="281100" cy="400200"/>
           </a:xfrm>
-        </p:grpSpPr>
-        <p:sp>
-          <p:nvSpPr>
-            <p:cNvPr id="92" name="Google Shape;92;g24e8104fe94_0_0"/>
-            <p:cNvSpPr txBox="1"/>
-            <p:nvPr/>
-          </p:nvSpPr>
-          <p:spPr>
-            <a:xfrm>
-              <a:off x="60700" y="74675"/>
-              <a:ext cx="281100" cy="400200"/>
-            </a:xfrm>
-            <a:prstGeom prst="rect">
-              <a:avLst/>
-            </a:prstGeom>
+          <a:prstGeom prst="rect">
+            <a:avLst/>
+          </a:prstGeom>
+          <a:noFill/>
+          <a:ln>
             <a:noFill/>
-            <a:ln>
-              <a:noFill/>
-            </a:ln>
-          </p:spPr>
-          <p:txBody>
-            <a:bodyPr spcFirstLastPara="1" wrap="square" lIns="91425" tIns="91425" rIns="91425" bIns="91425" anchor="t" anchorCtr="0">
-              <a:spAutoFit/>
-            </a:bodyPr>
-            <a:lstStyle/>
-            <a:p>
-              <a:pPr marL="0" marR="0" lvl="0" indent="0" algn="l" rtl="0">
-                <a:lnSpc>
-                  <a:spcPct val="100000"/>
-                </a:lnSpc>
-                <a:spcBef>
-                  <a:spcPts val="0"/>
-                </a:spcBef>
-                <a:spcAft>
-                  <a:spcPts val="0"/>
-                </a:spcAft>
-                <a:buClr>
+          </a:ln>
+        </p:spPr>
+        <p:txBody>
+          <a:bodyPr spcFirstLastPara="1" wrap="square" lIns="91425" tIns="91425" rIns="91425" bIns="91425" anchor="t" anchorCtr="0">
+            <a:spAutoFit/>
+          </a:bodyPr>
+          <a:lstStyle/>
+          <a:p>
+            <a:pPr marL="0" marR="0" lvl="0" indent="0" algn="l" rtl="0">
+              <a:lnSpc>
+                <a:spcPct val="100000"/>
+              </a:lnSpc>
+              <a:spcBef>
+                <a:spcPts val="0"/>
+              </a:spcBef>
+              <a:spcAft>
+                <a:spcPts val="0"/>
+              </a:spcAft>
+              <a:buClr>
+                <a:srgbClr val="000000"/>
+              </a:buClr>
+              <a:buSzPts val="1400"/>
+              <a:buFont typeface="Arial"/>
+              <a:buNone/>
+            </a:pPr>
+            <a:r>
+              <a:rPr lang="en" sz="1400" b="1" i="0" u="none" strike="noStrike" cap="none" dirty="0">
+                <a:solidFill>
                   <a:srgbClr val="000000"/>
-                </a:buClr>
-                <a:buSzPts val="1400"/>
-                <a:buFont typeface="Arial"/>
-                <a:buNone/>
-              </a:pPr>
-              <a:r>
-                <a:rPr lang="en" sz="1400" b="1" i="0" u="none" strike="noStrike" cap="none" dirty="0">
-                  <a:solidFill>
-                    <a:srgbClr val="000000"/>
-                  </a:solidFill>
-                  <a:latin typeface="Arial"/>
-                  <a:ea typeface="Arial"/>
-                  <a:cs typeface="Arial"/>
-                  <a:sym typeface="Arial"/>
-                </a:rPr>
-                <a:t>a</a:t>
-              </a:r>
-              <a:endParaRPr sz="1400" b="1" i="0" u="none" strike="noStrike" cap="none" dirty="0">
-                <a:solidFill>
-                  <a:srgbClr val="000000"/>
-                </a:solidFill>
-                <a:latin typeface="Arial"/>
-                <a:ea typeface="Arial"/>
-                <a:cs typeface="Arial"/>
-                <a:sym typeface="Arial"/>
-              </a:endParaRPr>
-            </a:p>
-          </p:txBody>
-        </p:sp>
-        <p:pic>
-          <p:nvPicPr>
-            <p:cNvPr id="105" name="Google Shape;105;g24e8104fe94_0_0"/>
-            <p:cNvPicPr preferRelativeResize="0"/>
-            <p:nvPr/>
-          </p:nvPicPr>
-          <p:blipFill rotWithShape="1">
-            <a:blip r:embed="rId8">
-              <a:alphaModFix/>
-            </a:blip>
-            <a:srcRect/>
-            <a:stretch/>
-          </p:blipFill>
-          <p:spPr>
-            <a:xfrm>
-              <a:off x="196252" y="462335"/>
-              <a:ext cx="3767668" cy="2119314"/>
-            </a:xfrm>
-            <a:prstGeom prst="rect">
-              <a:avLst/>
-            </a:prstGeom>
-            <a:noFill/>
-            <a:ln>
-              <a:noFill/>
-            </a:ln>
-          </p:spPr>
-        </p:pic>
-      </p:grpSp>
+                </a:solidFill>
+                <a:latin typeface="Arial"/>
+                <a:ea typeface="Arial"/>
+                <a:cs typeface="Arial"/>
+                <a:sym typeface="Arial"/>
+              </a:rPr>
+              <a:t>a</a:t>
+            </a:r>
+            <a:endParaRPr sz="1400" b="1" i="0" u="none" strike="noStrike" cap="none" dirty="0">
+              <a:solidFill>
+                <a:srgbClr val="000000"/>
+              </a:solidFill>
+              <a:latin typeface="Arial"/>
+              <a:ea typeface="Arial"/>
+              <a:cs typeface="Arial"/>
+              <a:sym typeface="Arial"/>
+            </a:endParaRPr>
+          </a:p>
+        </p:txBody>
+      </p:sp>
       <p:sp>
         <p:nvSpPr>
           <p:cNvPr id="102" name="Google Shape;102;g24e8104fe94_0_0"/>
@@ -9665,7 +9644,7 @@
         </p:nvSpPr>
         <p:spPr>
           <a:xfrm>
-            <a:off x="3958922" y="1075757"/>
+            <a:off x="3958922" y="1148575"/>
             <a:ext cx="281100" cy="400200"/>
           </a:xfrm>
           <a:prstGeom prst="rect">
@@ -9738,7 +9717,7 @@
           <p:nvPr/>
         </p:nvPicPr>
         <p:blipFill rotWithShape="1">
-          <a:blip r:embed="rId9"/>
+          <a:blip r:embed="rId11"/>
           <a:srcRect t="40189" b="49251"/>
           <a:stretch/>
         </p:blipFill>
@@ -9752,114 +9731,50 @@
           </a:prstGeom>
         </p:spPr>
       </p:pic>
-      <p:grpSp>
-        <p:nvGrpSpPr>
-          <p:cNvPr id="26" name="Group 25">
-            <a:extLst>
-              <a:ext uri="{FF2B5EF4-FFF2-40B4-BE49-F238E27FC236}">
-                <a16:creationId xmlns:a16="http://schemas.microsoft.com/office/drawing/2014/main" id="{4BDE6428-674D-3728-9FCF-3B2FA02D7846}"/>
-              </a:ext>
-            </a:extLst>
-          </p:cNvPr>
-          <p:cNvGrpSpPr/>
+      <p:sp>
+        <p:nvSpPr>
+          <p:cNvPr id="97" name="Google Shape;97;g24e8104fe94_0_0"/>
+          <p:cNvSpPr txBox="1"/>
           <p:nvPr/>
-        </p:nvGrpSpPr>
-        <p:grpSpPr>
+        </p:nvSpPr>
+        <p:spPr>
           <a:xfrm>
-            <a:off x="2567632" y="5812163"/>
-            <a:ext cx="2445621" cy="2881024"/>
-            <a:chOff x="2567632" y="5812163"/>
-            <a:chExt cx="2445621" cy="2881024"/>
+            <a:off x="2685900" y="5812163"/>
+            <a:ext cx="281100" cy="400200"/>
           </a:xfrm>
-        </p:grpSpPr>
-        <p:pic>
-          <p:nvPicPr>
-            <p:cNvPr id="21" name="Picture 20">
-              <a:extLst>
-                <a:ext uri="{FF2B5EF4-FFF2-40B4-BE49-F238E27FC236}">
-                  <a16:creationId xmlns:a16="http://schemas.microsoft.com/office/drawing/2014/main" id="{C0968A70-F3D7-A781-4D01-E6C64F4B8110}"/>
-                </a:ext>
-              </a:extLst>
-            </p:cNvPr>
-            <p:cNvPicPr>
-              <a:picLocks noChangeAspect="1"/>
-            </p:cNvPicPr>
-            <p:nvPr/>
-          </p:nvPicPr>
-          <p:blipFill>
-            <a:blip r:embed="rId10"/>
-            <a:stretch>
-              <a:fillRect/>
-            </a:stretch>
-          </p:blipFill>
-          <p:spPr>
-            <a:xfrm>
-              <a:off x="2567632" y="6022311"/>
-              <a:ext cx="2445621" cy="2670876"/>
-            </a:xfrm>
-            <a:prstGeom prst="rect">
-              <a:avLst/>
-            </a:prstGeom>
-          </p:spPr>
-        </p:pic>
-        <p:sp>
-          <p:nvSpPr>
-            <p:cNvPr id="97" name="Google Shape;97;g24e8104fe94_0_0"/>
-            <p:cNvSpPr txBox="1"/>
-            <p:nvPr/>
-          </p:nvSpPr>
-          <p:spPr>
-            <a:xfrm>
-              <a:off x="2685900" y="5812163"/>
-              <a:ext cx="281100" cy="400200"/>
-            </a:xfrm>
-            <a:prstGeom prst="rect">
-              <a:avLst/>
-            </a:prstGeom>
+          <a:prstGeom prst="rect">
+            <a:avLst/>
+          </a:prstGeom>
+          <a:noFill/>
+          <a:ln>
             <a:noFill/>
-            <a:ln>
-              <a:noFill/>
-            </a:ln>
-          </p:spPr>
-          <p:txBody>
-            <a:bodyPr spcFirstLastPara="1" wrap="square" lIns="91425" tIns="91425" rIns="91425" bIns="91425" anchor="t" anchorCtr="0">
-              <a:spAutoFit/>
-            </a:bodyPr>
-            <a:lstStyle/>
-            <a:p>
-              <a:pPr marL="0" marR="0" lvl="0" indent="0" algn="l" rtl="0">
-                <a:lnSpc>
-                  <a:spcPct val="100000"/>
-                </a:lnSpc>
-                <a:spcBef>
-                  <a:spcPts val="0"/>
-                </a:spcBef>
-                <a:spcAft>
-                  <a:spcPts val="0"/>
-                </a:spcAft>
-                <a:buClr>
-                  <a:srgbClr val="000000"/>
-                </a:buClr>
-                <a:buSzPts val="1400"/>
-                <a:buFont typeface="Arial"/>
-                <a:buNone/>
-              </a:pPr>
-              <a:r>
-                <a:rPr lang="en" sz="1400" b="1" i="0" u="none" strike="noStrike" cap="none" dirty="0">
-                  <a:solidFill>
-                    <a:srgbClr val="000000"/>
-                  </a:solidFill>
-                  <a:highlight>
-                    <a:schemeClr val="lt1"/>
-                  </a:highlight>
-                  <a:latin typeface="Arial"/>
-                  <a:ea typeface="Arial"/>
-                  <a:cs typeface="Arial"/>
-                  <a:sym typeface="Arial"/>
-                </a:rPr>
-                <a:t>h</a:t>
-              </a:r>
-              <a:endParaRPr sz="1400" b="1" i="0" u="none" strike="noStrike" cap="none" dirty="0">
+          </a:ln>
+        </p:spPr>
+        <p:txBody>
+          <a:bodyPr spcFirstLastPara="1" wrap="square" lIns="91425" tIns="91425" rIns="91425" bIns="91425" anchor="t" anchorCtr="0">
+            <a:spAutoFit/>
+          </a:bodyPr>
+          <a:lstStyle/>
+          <a:p>
+            <a:pPr marL="0" marR="0" lvl="0" indent="0" algn="l" rtl="0">
+              <a:lnSpc>
+                <a:spcPct val="100000"/>
+              </a:lnSpc>
+              <a:spcBef>
+                <a:spcPts val="0"/>
+              </a:spcBef>
+              <a:spcAft>
+                <a:spcPts val="0"/>
+              </a:spcAft>
+              <a:buClr>
+                <a:srgbClr val="000000"/>
+              </a:buClr>
+              <a:buSzPts val="1400"/>
+              <a:buFont typeface="Arial"/>
+              <a:buNone/>
+            </a:pPr>
+            <a:r>
+              <a:rPr lang="en" sz="1400" b="1" i="0" u="none" strike="noStrike" cap="none" dirty="0">
                 <a:solidFill>
                   <a:srgbClr val="000000"/>
                 </a:solidFill>
@@ -9870,11 +9785,24 @@
                 <a:ea typeface="Arial"/>
                 <a:cs typeface="Arial"/>
                 <a:sym typeface="Arial"/>
-              </a:endParaRPr>
-            </a:p>
-          </p:txBody>
-        </p:sp>
-      </p:grpSp>
+              </a:rPr>
+              <a:t>h</a:t>
+            </a:r>
+            <a:endParaRPr sz="1400" b="1" i="0" u="none" strike="noStrike" cap="none" dirty="0">
+              <a:solidFill>
+                <a:srgbClr val="000000"/>
+              </a:solidFill>
+              <a:highlight>
+                <a:schemeClr val="lt1"/>
+              </a:highlight>
+              <a:latin typeface="Arial"/>
+              <a:ea typeface="Arial"/>
+              <a:cs typeface="Arial"/>
+              <a:sym typeface="Arial"/>
+            </a:endParaRPr>
+          </a:p>
+        </p:txBody>
+      </p:sp>
       <p:pic>
         <p:nvPicPr>
           <p:cNvPr id="17" name="Picture 16">
@@ -9890,7 +9818,7 @@
           <p:nvPr/>
         </p:nvPicPr>
         <p:blipFill rotWithShape="1">
-          <a:blip r:embed="rId11"/>
+          <a:blip r:embed="rId12"/>
           <a:srcRect l="14337" r="29184"/>
           <a:stretch/>
         </p:blipFill>
@@ -9904,114 +9832,50 @@
           </a:prstGeom>
         </p:spPr>
       </p:pic>
-      <p:grpSp>
-        <p:nvGrpSpPr>
-          <p:cNvPr id="27" name="Group 26">
-            <a:extLst>
-              <a:ext uri="{FF2B5EF4-FFF2-40B4-BE49-F238E27FC236}">
-                <a16:creationId xmlns:a16="http://schemas.microsoft.com/office/drawing/2014/main" id="{FA1AF28C-7793-AD04-E495-3F1A01739C82}"/>
-              </a:ext>
-            </a:extLst>
-          </p:cNvPr>
-          <p:cNvGrpSpPr/>
+      <p:sp>
+        <p:nvSpPr>
+          <p:cNvPr id="98" name="Google Shape;98;g24e8104fe94_0_0"/>
+          <p:cNvSpPr txBox="1"/>
           <p:nvPr/>
-        </p:nvGrpSpPr>
-        <p:grpSpPr>
+        </p:nvSpPr>
+        <p:spPr>
           <a:xfrm>
-            <a:off x="4968256" y="5812163"/>
-            <a:ext cx="2364103" cy="2893724"/>
-            <a:chOff x="4968256" y="5812163"/>
-            <a:chExt cx="2364103" cy="2893724"/>
+            <a:off x="5047575" y="5812163"/>
+            <a:ext cx="281100" cy="400200"/>
           </a:xfrm>
-        </p:grpSpPr>
-        <p:pic>
-          <p:nvPicPr>
-            <p:cNvPr id="23" name="Picture 22">
-              <a:extLst>
-                <a:ext uri="{FF2B5EF4-FFF2-40B4-BE49-F238E27FC236}">
-                  <a16:creationId xmlns:a16="http://schemas.microsoft.com/office/drawing/2014/main" id="{4E726FD8-A803-D044-1F28-E78A5AFFF325}"/>
-                </a:ext>
-              </a:extLst>
-            </p:cNvPr>
-            <p:cNvPicPr>
-              <a:picLocks noChangeAspect="1"/>
-            </p:cNvPicPr>
-            <p:nvPr/>
-          </p:nvPicPr>
-          <p:blipFill>
-            <a:blip r:embed="rId12"/>
-            <a:stretch>
-              <a:fillRect/>
-            </a:stretch>
-          </p:blipFill>
-          <p:spPr>
-            <a:xfrm>
-              <a:off x="4968256" y="6022310"/>
-              <a:ext cx="2364103" cy="2683577"/>
-            </a:xfrm>
-            <a:prstGeom prst="rect">
-              <a:avLst/>
-            </a:prstGeom>
-          </p:spPr>
-        </p:pic>
-        <p:sp>
-          <p:nvSpPr>
-            <p:cNvPr id="98" name="Google Shape;98;g24e8104fe94_0_0"/>
-            <p:cNvSpPr txBox="1"/>
-            <p:nvPr/>
-          </p:nvSpPr>
-          <p:spPr>
-            <a:xfrm>
-              <a:off x="5047575" y="5812163"/>
-              <a:ext cx="281100" cy="400200"/>
-            </a:xfrm>
-            <a:prstGeom prst="rect">
-              <a:avLst/>
-            </a:prstGeom>
+          <a:prstGeom prst="rect">
+            <a:avLst/>
+          </a:prstGeom>
+          <a:noFill/>
+          <a:ln>
             <a:noFill/>
-            <a:ln>
-              <a:noFill/>
-            </a:ln>
-          </p:spPr>
-          <p:txBody>
-            <a:bodyPr spcFirstLastPara="1" wrap="square" lIns="91425" tIns="91425" rIns="91425" bIns="91425" anchor="t" anchorCtr="0">
-              <a:spAutoFit/>
-            </a:bodyPr>
-            <a:lstStyle/>
-            <a:p>
-              <a:pPr marL="0" marR="0" lvl="0" indent="0" algn="l" rtl="0">
-                <a:lnSpc>
-                  <a:spcPct val="100000"/>
-                </a:lnSpc>
-                <a:spcBef>
-                  <a:spcPts val="0"/>
-                </a:spcBef>
-                <a:spcAft>
-                  <a:spcPts val="0"/>
-                </a:spcAft>
-                <a:buClr>
-                  <a:srgbClr val="000000"/>
-                </a:buClr>
-                <a:buSzPts val="1400"/>
-                <a:buFont typeface="Arial"/>
-                <a:buNone/>
-              </a:pPr>
-              <a:r>
-                <a:rPr lang="en" sz="1400" b="1" i="0" u="none" strike="noStrike" cap="none" dirty="0" err="1">
-                  <a:solidFill>
-                    <a:srgbClr val="000000"/>
-                  </a:solidFill>
-                  <a:highlight>
-                    <a:schemeClr val="lt1"/>
-                  </a:highlight>
-                  <a:latin typeface="Arial"/>
-                  <a:ea typeface="Arial"/>
-                  <a:cs typeface="Arial"/>
-                  <a:sym typeface="Arial"/>
-                </a:rPr>
-                <a:t>i</a:t>
-              </a:r>
-              <a:endParaRPr sz="1400" b="1" i="0" u="none" strike="noStrike" cap="none" dirty="0">
+          </a:ln>
+        </p:spPr>
+        <p:txBody>
+          <a:bodyPr spcFirstLastPara="1" wrap="square" lIns="91425" tIns="91425" rIns="91425" bIns="91425" anchor="t" anchorCtr="0">
+            <a:spAutoFit/>
+          </a:bodyPr>
+          <a:lstStyle/>
+          <a:p>
+            <a:pPr marL="0" marR="0" lvl="0" indent="0" algn="l" rtl="0">
+              <a:lnSpc>
+                <a:spcPct val="100000"/>
+              </a:lnSpc>
+              <a:spcBef>
+                <a:spcPts val="0"/>
+              </a:spcBef>
+              <a:spcAft>
+                <a:spcPts val="0"/>
+              </a:spcAft>
+              <a:buClr>
+                <a:srgbClr val="000000"/>
+              </a:buClr>
+              <a:buSzPts val="1400"/>
+              <a:buFont typeface="Arial"/>
+              <a:buNone/>
+            </a:pPr>
+            <a:r>
+              <a:rPr lang="en" sz="1400" b="1" i="0" u="none" strike="noStrike" cap="none" dirty="0" err="1">
                 <a:solidFill>
                   <a:srgbClr val="000000"/>
                 </a:solidFill>
@@ -10022,11 +9886,24 @@
                 <a:ea typeface="Arial"/>
                 <a:cs typeface="Arial"/>
                 <a:sym typeface="Arial"/>
-              </a:endParaRPr>
-            </a:p>
-          </p:txBody>
-        </p:sp>
-      </p:grpSp>
+              </a:rPr>
+              <a:t>i</a:t>
+            </a:r>
+            <a:endParaRPr sz="1400" b="1" i="0" u="none" strike="noStrike" cap="none" dirty="0">
+              <a:solidFill>
+                <a:srgbClr val="000000"/>
+              </a:solidFill>
+              <a:highlight>
+                <a:schemeClr val="lt1"/>
+              </a:highlight>
+              <a:latin typeface="Arial"/>
+              <a:ea typeface="Arial"/>
+              <a:cs typeface="Arial"/>
+              <a:sym typeface="Arial"/>
+            </a:endParaRPr>
+          </a:p>
+        </p:txBody>
+      </p:sp>
       <p:pic>
         <p:nvPicPr>
           <p:cNvPr id="5" name="Picture 4">
@@ -10057,12 +9934,78 @@
           </a:prstGeom>
         </p:spPr>
       </p:pic>
+      <p:sp>
+        <p:nvSpPr>
+          <p:cNvPr id="99" name="Google Shape;99;g24e8104fe94_0_0"/>
+          <p:cNvSpPr txBox="1"/>
+          <p:nvPr/>
+        </p:nvSpPr>
+        <p:spPr>
+          <a:xfrm>
+            <a:off x="2385301" y="9004644"/>
+            <a:ext cx="281100" cy="431100"/>
+          </a:xfrm>
+          <a:prstGeom prst="rect">
+            <a:avLst/>
+          </a:prstGeom>
+          <a:noFill/>
+          <a:ln>
+            <a:noFill/>
+          </a:ln>
+        </p:spPr>
+        <p:txBody>
+          <a:bodyPr spcFirstLastPara="1" wrap="square" lIns="91425" tIns="91425" rIns="91425" bIns="91425" anchor="t" anchorCtr="0">
+            <a:spAutoFit/>
+          </a:bodyPr>
+          <a:lstStyle/>
+          <a:p>
+            <a:pPr marL="0" marR="0" lvl="0" indent="0" algn="l" rtl="0">
+              <a:lnSpc>
+                <a:spcPct val="100000"/>
+              </a:lnSpc>
+              <a:spcBef>
+                <a:spcPts val="0"/>
+              </a:spcBef>
+              <a:spcAft>
+                <a:spcPts val="0"/>
+              </a:spcAft>
+              <a:buClr>
+                <a:srgbClr val="000000"/>
+              </a:buClr>
+              <a:buSzPts val="1600"/>
+              <a:buFont typeface="Arial"/>
+              <a:buNone/>
+            </a:pPr>
+            <a:r>
+              <a:rPr lang="en" sz="1600" b="1" i="0" u="none" strike="noStrike" cap="none" dirty="0">
+                <a:solidFill>
+                  <a:srgbClr val="000000"/>
+                </a:solidFill>
+                <a:latin typeface="Arial"/>
+                <a:ea typeface="Arial"/>
+                <a:cs typeface="Arial"/>
+                <a:sym typeface="Arial"/>
+              </a:rPr>
+              <a:t>k</a:t>
+            </a:r>
+            <a:endParaRPr sz="1600" b="1" i="0" u="none" strike="noStrike" cap="none" dirty="0">
+              <a:solidFill>
+                <a:srgbClr val="000000"/>
+              </a:solidFill>
+              <a:latin typeface="Arial"/>
+              <a:ea typeface="Arial"/>
+              <a:cs typeface="Arial"/>
+              <a:sym typeface="Arial"/>
+            </a:endParaRPr>
+          </a:p>
+        </p:txBody>
+      </p:sp>
       <p:pic>
         <p:nvPicPr>
-          <p:cNvPr id="3" name="Picture 2">
+          <p:cNvPr id="29" name="Picture 28">
             <a:extLst>
               <a:ext uri="{FF2B5EF4-FFF2-40B4-BE49-F238E27FC236}">
-                <a16:creationId xmlns:a16="http://schemas.microsoft.com/office/drawing/2014/main" id="{C058550E-F54E-F993-ABF7-0FDB8519EB55}"/>
+                <a16:creationId xmlns:a16="http://schemas.microsoft.com/office/drawing/2014/main" id="{46FC3117-645E-494E-3A78-FFDBDF55901F}"/>
               </a:ext>
             </a:extLst>
           </p:cNvPr>
@@ -10079,131 +10022,74 @@
         </p:blipFill>
         <p:spPr>
           <a:xfrm>
-            <a:off x="4159264" y="1186183"/>
-            <a:ext cx="2860516" cy="1591056"/>
+            <a:off x="619485" y="8649652"/>
+            <a:ext cx="1445895" cy="132715"/>
           </a:xfrm>
           <a:prstGeom prst="rect">
             <a:avLst/>
           </a:prstGeom>
         </p:spPr>
       </p:pic>
-      <p:grpSp>
-        <p:nvGrpSpPr>
-          <p:cNvPr id="13" name="Group 12">
+      <p:pic>
+        <p:nvPicPr>
+          <p:cNvPr id="36" name="Picture 35">
             <a:extLst>
               <a:ext uri="{FF2B5EF4-FFF2-40B4-BE49-F238E27FC236}">
-                <a16:creationId xmlns:a16="http://schemas.microsoft.com/office/drawing/2014/main" id="{D216A092-7856-4AE8-1AEB-EFCE670573B1}"/>
+                <a16:creationId xmlns:a16="http://schemas.microsoft.com/office/drawing/2014/main" id="{284ADA65-29C9-F591-20FC-5716E21CC670}"/>
               </a:ext>
             </a:extLst>
           </p:cNvPr>
-          <p:cNvGrpSpPr/>
+          <p:cNvPicPr>
+            <a:picLocks noChangeAspect="1"/>
+          </p:cNvPicPr>
           <p:nvPr/>
-        </p:nvGrpSpPr>
-        <p:grpSpPr>
+        </p:nvPicPr>
+        <p:blipFill>
+          <a:blip r:embed="rId15"/>
+          <a:stretch>
+            <a:fillRect/>
+          </a:stretch>
+        </p:blipFill>
+        <p:spPr>
           <a:xfrm>
-            <a:off x="2392768" y="9044588"/>
-            <a:ext cx="3136224" cy="1179700"/>
-            <a:chOff x="2392768" y="9044588"/>
-            <a:chExt cx="3136224" cy="1179700"/>
+            <a:off x="2613968" y="9340081"/>
+            <a:ext cx="2909764" cy="932688"/>
           </a:xfrm>
-        </p:grpSpPr>
-        <p:sp>
-          <p:nvSpPr>
-            <p:cNvPr id="99" name="Google Shape;99;g24e8104fe94_0_0"/>
-            <p:cNvSpPr txBox="1"/>
-            <p:nvPr/>
-          </p:nvSpPr>
-          <p:spPr>
-            <a:xfrm>
-              <a:off x="2392768" y="9044588"/>
-              <a:ext cx="281100" cy="431100"/>
-            </a:xfrm>
-            <a:prstGeom prst="rect">
-              <a:avLst/>
-            </a:prstGeom>
-            <a:noFill/>
-            <a:ln>
-              <a:noFill/>
-            </a:ln>
-          </p:spPr>
-          <p:txBody>
-            <a:bodyPr spcFirstLastPara="1" wrap="square" lIns="91425" tIns="91425" rIns="91425" bIns="91425" anchor="t" anchorCtr="0">
-              <a:spAutoFit/>
-            </a:bodyPr>
-            <a:lstStyle/>
-            <a:p>
-              <a:pPr marL="0" marR="0" lvl="0" indent="0" algn="l" rtl="0">
-                <a:lnSpc>
-                  <a:spcPct val="100000"/>
-                </a:lnSpc>
-                <a:spcBef>
-                  <a:spcPts val="0"/>
-                </a:spcBef>
-                <a:spcAft>
-                  <a:spcPts val="0"/>
-                </a:spcAft>
-                <a:buClr>
-                  <a:srgbClr val="000000"/>
-                </a:buClr>
-                <a:buSzPts val="1600"/>
-                <a:buFont typeface="Arial"/>
-                <a:buNone/>
-              </a:pPr>
-              <a:r>
-                <a:rPr lang="en" sz="1600" b="1" i="0" u="none" strike="noStrike" cap="none" dirty="0">
-                  <a:solidFill>
-                    <a:srgbClr val="000000"/>
-                  </a:solidFill>
-                  <a:latin typeface="Arial"/>
-                  <a:ea typeface="Arial"/>
-                  <a:cs typeface="Arial"/>
-                  <a:sym typeface="Arial"/>
-                </a:rPr>
-                <a:t>k</a:t>
-              </a:r>
-              <a:endParaRPr sz="1600" b="1" i="0" u="none" strike="noStrike" cap="none" dirty="0">
-                <a:solidFill>
-                  <a:srgbClr val="000000"/>
-                </a:solidFill>
-                <a:latin typeface="Arial"/>
-                <a:ea typeface="Arial"/>
-                <a:cs typeface="Arial"/>
-                <a:sym typeface="Arial"/>
-              </a:endParaRPr>
-            </a:p>
-          </p:txBody>
-        </p:sp>
-        <p:pic>
-          <p:nvPicPr>
-            <p:cNvPr id="11" name="Picture 10">
-              <a:extLst>
-                <a:ext uri="{FF2B5EF4-FFF2-40B4-BE49-F238E27FC236}">
-                  <a16:creationId xmlns:a16="http://schemas.microsoft.com/office/drawing/2014/main" id="{007002DF-CCB6-4327-F8C8-AE5D400BB31D}"/>
-                </a:ext>
-              </a:extLst>
-            </p:cNvPr>
-            <p:cNvPicPr>
-              <a:picLocks noChangeAspect="1"/>
-            </p:cNvPicPr>
-            <p:nvPr/>
-          </p:nvPicPr>
-          <p:blipFill>
-            <a:blip r:embed="rId15"/>
-            <a:stretch>
-              <a:fillRect/>
-            </a:stretch>
-          </p:blipFill>
-          <p:spPr>
-            <a:xfrm>
-              <a:off x="2625561" y="9293630"/>
-              <a:ext cx="2903431" cy="930658"/>
-            </a:xfrm>
-            <a:prstGeom prst="rect">
-              <a:avLst/>
-            </a:prstGeom>
-          </p:spPr>
-        </p:pic>
-      </p:grpSp>
+          <a:prstGeom prst="rect">
+            <a:avLst/>
+          </a:prstGeom>
+        </p:spPr>
+      </p:pic>
+      <p:pic>
+        <p:nvPicPr>
+          <p:cNvPr id="3" name="Picture 2">
+            <a:extLst>
+              <a:ext uri="{FF2B5EF4-FFF2-40B4-BE49-F238E27FC236}">
+                <a16:creationId xmlns:a16="http://schemas.microsoft.com/office/drawing/2014/main" id="{2B92A304-2D28-CE67-2899-AA481BE3C87B}"/>
+              </a:ext>
+            </a:extLst>
+          </p:cNvPr>
+          <p:cNvPicPr>
+            <a:picLocks noChangeAspect="1"/>
+          </p:cNvPicPr>
+          <p:nvPr/>
+        </p:nvPicPr>
+        <p:blipFill>
+          <a:blip r:embed="rId16"/>
+          <a:stretch>
+            <a:fillRect/>
+          </a:stretch>
+        </p:blipFill>
+        <p:spPr>
+          <a:xfrm>
+            <a:off x="4282442" y="1248101"/>
+            <a:ext cx="2862072" cy="1591921"/>
+          </a:xfrm>
+          <a:prstGeom prst="rect">
+            <a:avLst/>
+          </a:prstGeom>
+        </p:spPr>
+      </p:pic>
     </p:spTree>
   </p:cSld>
   <p:clrMapOvr>

</xml_diff>